<commit_message>
fixed some spelling errors instead of adding locally downloaded and compiled bwa and samtools to PATH, they compare the versions to the ones installed by puppet via yum removed the 'reference' directory, since we use data/fasta instead.
</commit_message>
<xml_diff>
--- a/doc/slides/day1/session4/NGSAnalyses.pptx
+++ b/doc/slides/day1/session4/NGSAnalyses.pptx
@@ -1,6 +1,6 @@
 
 <file path=ppt/presentation.xml><?xml version="1.0" encoding="utf-8"?>
-<p:presentation xmlns:a="http://schemas.openxmlformats.org/drawingml/2006/main" xmlns:r="http://schemas.openxmlformats.org/officeDocument/2006/relationships" xmlns:mc="http://schemas.openxmlformats.org/markup-compatibility/2006" xmlns:mv="urn:schemas-microsoft-com:mac:vml" xmlns:p="http://schemas.openxmlformats.org/presentationml/2006/main" mc:Ignorable="mv" mc:PreserveAttributes="mv:*" saveSubsetFonts="1" autoCompressPictures="0">
+<p:presentation xmlns:a="http://schemas.openxmlformats.org/drawingml/2006/main" xmlns:r="http://schemas.openxmlformats.org/officeDocument/2006/relationships" xmlns:p="http://schemas.openxmlformats.org/presentationml/2006/main" saveSubsetFonts="1" autoCompressPictures="0">
   <p:sldMasterIdLst>
     <p:sldMasterId id="2147483648" r:id="rId1"/>
   </p:sldMasterIdLst>
@@ -118,7 +118,7 @@
 </file>
 
 <file path=ppt/notesMasters/notesMaster1.xml><?xml version="1.0" encoding="utf-8"?>
-<p:notesMaster xmlns:a="http://schemas.openxmlformats.org/drawingml/2006/main" xmlns:r="http://schemas.openxmlformats.org/officeDocument/2006/relationships" xmlns:mc="http://schemas.openxmlformats.org/markup-compatibility/2006" xmlns:mv="urn:schemas-microsoft-com:mac:vml" xmlns:p="http://schemas.openxmlformats.org/presentationml/2006/main" mc:Ignorable="mv" mc:PreserveAttributes="mv:*">
+<p:notesMaster xmlns:a="http://schemas.openxmlformats.org/drawingml/2006/main" xmlns:r="http://schemas.openxmlformats.org/officeDocument/2006/relationships" xmlns:p="http://schemas.openxmlformats.org/presentationml/2006/main">
   <p:cSld>
     <p:bg>
       <p:bgRef idx="1001">
@@ -200,7 +200,7 @@
             <a:fld id="{7F2416E4-91AF-C94B-A1BC-2728F95D87A7}" type="datetimeFigureOut">
               <a:rPr lang="en-US" smtClean="0"/>
               <a:pPr/>
-              <a:t>9/10/12</a:t>
+              <a:t>10/18/13</a:t>
             </a:fld>
             <a:endParaRPr lang="en-US"/>
           </a:p>
@@ -369,6 +369,11 @@
         </p:txBody>
       </p:sp>
     </p:spTree>
+    <p:extLst>
+      <p:ext uri="{BB962C8B-B14F-4D97-AF65-F5344CB8AC3E}">
+        <p14:creationId xmlns:p14="http://schemas.microsoft.com/office/powerpoint/2010/main" val="3120965689"/>
+      </p:ext>
+    </p:extLst>
   </p:cSld>
   <p:clrMap bg1="lt1" tx1="dk1" bg2="lt2" tx2="dk2" accent1="accent1" accent2="accent2" accent3="accent3" accent4="accent4" accent5="accent5" accent6="accent6" hlink="hlink" folHlink="folHlink"/>
   <p:notesStyle>
@@ -467,7 +472,7 @@
 </file>
 
 <file path=ppt/notesSlides/notesSlide1.xml><?xml version="1.0" encoding="utf-8"?>
-<p:notes xmlns:a="http://schemas.openxmlformats.org/drawingml/2006/main" xmlns:r="http://schemas.openxmlformats.org/officeDocument/2006/relationships" xmlns:mc="http://schemas.openxmlformats.org/markup-compatibility/2006" xmlns:mv="urn:schemas-microsoft-com:mac:vml" xmlns:p="http://schemas.openxmlformats.org/presentationml/2006/main" mc:Ignorable="mv" mc:PreserveAttributes="mv:*">
+<p:notes xmlns:a="http://schemas.openxmlformats.org/drawingml/2006/main" xmlns:r="http://schemas.openxmlformats.org/officeDocument/2006/relationships" xmlns:p="http://schemas.openxmlformats.org/presentationml/2006/main">
   <p:cSld>
     <p:spTree>
       <p:nvGrpSpPr>
@@ -589,7 +594,7 @@
 </file>
 
 <file path=ppt/notesSlides/notesSlide2.xml><?xml version="1.0" encoding="utf-8"?>
-<p:notes xmlns:a="http://schemas.openxmlformats.org/drawingml/2006/main" xmlns:r="http://schemas.openxmlformats.org/officeDocument/2006/relationships" xmlns:mc="http://schemas.openxmlformats.org/markup-compatibility/2006" xmlns:mv="urn:schemas-microsoft-com:mac:vml" xmlns:p="http://schemas.openxmlformats.org/presentationml/2006/main" mc:Ignorable="mv" mc:PreserveAttributes="mv:*">
+<p:notes xmlns:a="http://schemas.openxmlformats.org/drawingml/2006/main" xmlns:r="http://schemas.openxmlformats.org/officeDocument/2006/relationships" xmlns:p="http://schemas.openxmlformats.org/presentationml/2006/main">
   <p:cSld>
     <p:spTree>
       <p:nvGrpSpPr>
@@ -675,7 +680,7 @@
 </file>
 
 <file path=ppt/notesSlides/notesSlide3.xml><?xml version="1.0" encoding="utf-8"?>
-<p:notes xmlns:a="http://schemas.openxmlformats.org/drawingml/2006/main" xmlns:r="http://schemas.openxmlformats.org/officeDocument/2006/relationships" xmlns:mc="http://schemas.openxmlformats.org/markup-compatibility/2006" xmlns:mv="urn:schemas-microsoft-com:mac:vml" xmlns:p="http://schemas.openxmlformats.org/presentationml/2006/main" mc:Ignorable="mv" mc:PreserveAttributes="mv:*">
+<p:notes xmlns:a="http://schemas.openxmlformats.org/drawingml/2006/main" xmlns:r="http://schemas.openxmlformats.org/officeDocument/2006/relationships" xmlns:p="http://schemas.openxmlformats.org/presentationml/2006/main">
   <p:cSld>
     <p:spTree>
       <p:nvGrpSpPr>
@@ -777,7 +782,7 @@
 </file>
 
 <file path=ppt/slideLayouts/slideLayout1.xml><?xml version="1.0" encoding="utf-8"?>
-<p:sldLayout xmlns:a="http://schemas.openxmlformats.org/drawingml/2006/main" xmlns:r="http://schemas.openxmlformats.org/officeDocument/2006/relationships" xmlns:mc="http://schemas.openxmlformats.org/markup-compatibility/2006" xmlns:mv="urn:schemas-microsoft-com:mac:vml" xmlns:p="http://schemas.openxmlformats.org/presentationml/2006/main" mc:Ignorable="mv" mc:PreserveAttributes="mv:*" type="title" preserve="1">
+<p:sldLayout xmlns:a="http://schemas.openxmlformats.org/drawingml/2006/main" xmlns:r="http://schemas.openxmlformats.org/officeDocument/2006/relationships" xmlns:p="http://schemas.openxmlformats.org/presentationml/2006/main" type="title" preserve="1">
   <p:cSld name="Title Slide">
     <p:spTree>
       <p:nvGrpSpPr>
@@ -958,7 +963,7 @@
             <a:fld id="{F3BCCCC7-6A45-A647-850E-B4CE4DABA2A7}" type="datetimeFigureOut">
               <a:rPr lang="en-US" smtClean="0"/>
               <a:pPr/>
-              <a:t>9/10/12</a:t>
+              <a:t>10/18/13</a:t>
             </a:fld>
             <a:endParaRPr lang="en-US"/>
           </a:p>
@@ -1016,7 +1021,7 @@
 </file>
 
 <file path=ppt/slideLayouts/slideLayout10.xml><?xml version="1.0" encoding="utf-8"?>
-<p:sldLayout xmlns:a="http://schemas.openxmlformats.org/drawingml/2006/main" xmlns:r="http://schemas.openxmlformats.org/officeDocument/2006/relationships" xmlns:mc="http://schemas.openxmlformats.org/markup-compatibility/2006" xmlns:mv="urn:schemas-microsoft-com:mac:vml" xmlns:p="http://schemas.openxmlformats.org/presentationml/2006/main" mc:Ignorable="mv" mc:PreserveAttributes="mv:*" type="vertTx" preserve="1">
+<p:sldLayout xmlns:a="http://schemas.openxmlformats.org/drawingml/2006/main" xmlns:r="http://schemas.openxmlformats.org/officeDocument/2006/relationships" xmlns:p="http://schemas.openxmlformats.org/presentationml/2006/main" type="vertTx" preserve="1">
   <p:cSld name="Title and Vertical Text">
     <p:spTree>
       <p:nvGrpSpPr>
@@ -1125,7 +1130,7 @@
             <a:fld id="{F3BCCCC7-6A45-A647-850E-B4CE4DABA2A7}" type="datetimeFigureOut">
               <a:rPr lang="en-US" smtClean="0"/>
               <a:pPr/>
-              <a:t>9/10/12</a:t>
+              <a:t>10/18/13</a:t>
             </a:fld>
             <a:endParaRPr lang="en-US"/>
           </a:p>
@@ -1183,7 +1188,7 @@
 </file>
 
 <file path=ppt/slideLayouts/slideLayout11.xml><?xml version="1.0" encoding="utf-8"?>
-<p:sldLayout xmlns:a="http://schemas.openxmlformats.org/drawingml/2006/main" xmlns:r="http://schemas.openxmlformats.org/officeDocument/2006/relationships" xmlns:mc="http://schemas.openxmlformats.org/markup-compatibility/2006" xmlns:mv="urn:schemas-microsoft-com:mac:vml" xmlns:p="http://schemas.openxmlformats.org/presentationml/2006/main" mc:Ignorable="mv" mc:PreserveAttributes="mv:*" type="vertTitleAndTx" preserve="1">
+<p:sldLayout xmlns:a="http://schemas.openxmlformats.org/drawingml/2006/main" xmlns:r="http://schemas.openxmlformats.org/officeDocument/2006/relationships" xmlns:p="http://schemas.openxmlformats.org/presentationml/2006/main" type="vertTitleAndTx" preserve="1">
   <p:cSld name="Vertical Title and Text">
     <p:spTree>
       <p:nvGrpSpPr>
@@ -1302,7 +1307,7 @@
             <a:fld id="{F3BCCCC7-6A45-A647-850E-B4CE4DABA2A7}" type="datetimeFigureOut">
               <a:rPr lang="en-US" smtClean="0"/>
               <a:pPr/>
-              <a:t>9/10/12</a:t>
+              <a:t>10/18/13</a:t>
             </a:fld>
             <a:endParaRPr lang="en-US"/>
           </a:p>
@@ -1360,7 +1365,7 @@
 </file>
 
 <file path=ppt/slideLayouts/slideLayout2.xml><?xml version="1.0" encoding="utf-8"?>
-<p:sldLayout xmlns:a="http://schemas.openxmlformats.org/drawingml/2006/main" xmlns:r="http://schemas.openxmlformats.org/officeDocument/2006/relationships" xmlns:mc="http://schemas.openxmlformats.org/markup-compatibility/2006" xmlns:mv="urn:schemas-microsoft-com:mac:vml" xmlns:p="http://schemas.openxmlformats.org/presentationml/2006/main" mc:Ignorable="mv" mc:PreserveAttributes="mv:*" type="obj" preserve="1">
+<p:sldLayout xmlns:a="http://schemas.openxmlformats.org/drawingml/2006/main" xmlns:r="http://schemas.openxmlformats.org/officeDocument/2006/relationships" xmlns:p="http://schemas.openxmlformats.org/presentationml/2006/main" type="obj" preserve="1">
   <p:cSld name="Title and Content">
     <p:spTree>
       <p:nvGrpSpPr>
@@ -1469,7 +1474,7 @@
             <a:fld id="{F3BCCCC7-6A45-A647-850E-B4CE4DABA2A7}" type="datetimeFigureOut">
               <a:rPr lang="en-US" smtClean="0"/>
               <a:pPr/>
-              <a:t>9/10/12</a:t>
+              <a:t>10/18/13</a:t>
             </a:fld>
             <a:endParaRPr lang="en-US"/>
           </a:p>
@@ -1527,7 +1532,7 @@
 </file>
 
 <file path=ppt/slideLayouts/slideLayout3.xml><?xml version="1.0" encoding="utf-8"?>
-<p:sldLayout xmlns:a="http://schemas.openxmlformats.org/drawingml/2006/main" xmlns:r="http://schemas.openxmlformats.org/officeDocument/2006/relationships" xmlns:mc="http://schemas.openxmlformats.org/markup-compatibility/2006" xmlns:mv="urn:schemas-microsoft-com:mac:vml" xmlns:p="http://schemas.openxmlformats.org/presentationml/2006/main" mc:Ignorable="mv" mc:PreserveAttributes="mv:*" type="secHead" preserve="1">
+<p:sldLayout xmlns:a="http://schemas.openxmlformats.org/drawingml/2006/main" xmlns:r="http://schemas.openxmlformats.org/officeDocument/2006/relationships" xmlns:p="http://schemas.openxmlformats.org/presentationml/2006/main" type="secHead" preserve="1">
   <p:cSld name="Section Header">
     <p:spTree>
       <p:nvGrpSpPr>
@@ -1712,7 +1717,7 @@
             <a:fld id="{F3BCCCC7-6A45-A647-850E-B4CE4DABA2A7}" type="datetimeFigureOut">
               <a:rPr lang="en-US" smtClean="0"/>
               <a:pPr/>
-              <a:t>9/10/12</a:t>
+              <a:t>10/18/13</a:t>
             </a:fld>
             <a:endParaRPr lang="en-US"/>
           </a:p>
@@ -1770,7 +1775,7 @@
 </file>
 
 <file path=ppt/slideLayouts/slideLayout4.xml><?xml version="1.0" encoding="utf-8"?>
-<p:sldLayout xmlns:a="http://schemas.openxmlformats.org/drawingml/2006/main" xmlns:r="http://schemas.openxmlformats.org/officeDocument/2006/relationships" xmlns:mc="http://schemas.openxmlformats.org/markup-compatibility/2006" xmlns:mv="urn:schemas-microsoft-com:mac:vml" xmlns:p="http://schemas.openxmlformats.org/presentationml/2006/main" mc:Ignorable="mv" mc:PreserveAttributes="mv:*" type="twoObj" preserve="1">
+<p:sldLayout xmlns:a="http://schemas.openxmlformats.org/drawingml/2006/main" xmlns:r="http://schemas.openxmlformats.org/officeDocument/2006/relationships" xmlns:p="http://schemas.openxmlformats.org/presentationml/2006/main" type="twoObj" preserve="1">
   <p:cSld name="Two Content">
     <p:spTree>
       <p:nvGrpSpPr>
@@ -1997,7 +2002,7 @@
             <a:fld id="{F3BCCCC7-6A45-A647-850E-B4CE4DABA2A7}" type="datetimeFigureOut">
               <a:rPr lang="en-US" smtClean="0"/>
               <a:pPr/>
-              <a:t>9/10/12</a:t>
+              <a:t>10/18/13</a:t>
             </a:fld>
             <a:endParaRPr lang="en-US"/>
           </a:p>
@@ -2055,7 +2060,7 @@
 </file>
 
 <file path=ppt/slideLayouts/slideLayout5.xml><?xml version="1.0" encoding="utf-8"?>
-<p:sldLayout xmlns:a="http://schemas.openxmlformats.org/drawingml/2006/main" xmlns:r="http://schemas.openxmlformats.org/officeDocument/2006/relationships" xmlns:mc="http://schemas.openxmlformats.org/markup-compatibility/2006" xmlns:mv="urn:schemas-microsoft-com:mac:vml" xmlns:p="http://schemas.openxmlformats.org/presentationml/2006/main" mc:Ignorable="mv" mc:PreserveAttributes="mv:*" type="twoTxTwoObj" preserve="1">
+<p:sldLayout xmlns:a="http://schemas.openxmlformats.org/drawingml/2006/main" xmlns:r="http://schemas.openxmlformats.org/officeDocument/2006/relationships" xmlns:p="http://schemas.openxmlformats.org/presentationml/2006/main" type="twoTxTwoObj" preserve="1">
   <p:cSld name="Comparison">
     <p:spTree>
       <p:nvGrpSpPr>
@@ -2416,7 +2421,7 @@
             <a:fld id="{F3BCCCC7-6A45-A647-850E-B4CE4DABA2A7}" type="datetimeFigureOut">
               <a:rPr lang="en-US" smtClean="0"/>
               <a:pPr/>
-              <a:t>9/10/12</a:t>
+              <a:t>10/18/13</a:t>
             </a:fld>
             <a:endParaRPr lang="en-US"/>
           </a:p>
@@ -2474,7 +2479,7 @@
 </file>
 
 <file path=ppt/slideLayouts/slideLayout6.xml><?xml version="1.0" encoding="utf-8"?>
-<p:sldLayout xmlns:a="http://schemas.openxmlformats.org/drawingml/2006/main" xmlns:r="http://schemas.openxmlformats.org/officeDocument/2006/relationships" xmlns:mc="http://schemas.openxmlformats.org/markup-compatibility/2006" xmlns:mv="urn:schemas-microsoft-com:mac:vml" xmlns:p="http://schemas.openxmlformats.org/presentationml/2006/main" mc:Ignorable="mv" mc:PreserveAttributes="mv:*" type="titleOnly" preserve="1">
+<p:sldLayout xmlns:a="http://schemas.openxmlformats.org/drawingml/2006/main" xmlns:r="http://schemas.openxmlformats.org/officeDocument/2006/relationships" xmlns:p="http://schemas.openxmlformats.org/presentationml/2006/main" type="titleOnly" preserve="1">
   <p:cSld name="Title Only">
     <p:spTree>
       <p:nvGrpSpPr>
@@ -2531,7 +2536,7 @@
             <a:fld id="{F3BCCCC7-6A45-A647-850E-B4CE4DABA2A7}" type="datetimeFigureOut">
               <a:rPr lang="en-US" smtClean="0"/>
               <a:pPr/>
-              <a:t>9/10/12</a:t>
+              <a:t>10/18/13</a:t>
             </a:fld>
             <a:endParaRPr lang="en-US"/>
           </a:p>
@@ -2589,7 +2594,7 @@
 </file>
 
 <file path=ppt/slideLayouts/slideLayout7.xml><?xml version="1.0" encoding="utf-8"?>
-<p:sldLayout xmlns:a="http://schemas.openxmlformats.org/drawingml/2006/main" xmlns:r="http://schemas.openxmlformats.org/officeDocument/2006/relationships" xmlns:mc="http://schemas.openxmlformats.org/markup-compatibility/2006" xmlns:mv="urn:schemas-microsoft-com:mac:vml" xmlns:p="http://schemas.openxmlformats.org/presentationml/2006/main" mc:Ignorable="mv" mc:PreserveAttributes="mv:*" type="blank" preserve="1">
+<p:sldLayout xmlns:a="http://schemas.openxmlformats.org/drawingml/2006/main" xmlns:r="http://schemas.openxmlformats.org/officeDocument/2006/relationships" xmlns:p="http://schemas.openxmlformats.org/presentationml/2006/main" type="blank" preserve="1">
   <p:cSld name="Blank">
     <p:spTree>
       <p:nvGrpSpPr>
@@ -2623,7 +2628,7 @@
             <a:fld id="{F3BCCCC7-6A45-A647-850E-B4CE4DABA2A7}" type="datetimeFigureOut">
               <a:rPr lang="en-US" smtClean="0"/>
               <a:pPr/>
-              <a:t>9/10/12</a:t>
+              <a:t>10/18/13</a:t>
             </a:fld>
             <a:endParaRPr lang="en-US"/>
           </a:p>
@@ -2681,7 +2686,7 @@
 </file>
 
 <file path=ppt/slideLayouts/slideLayout8.xml><?xml version="1.0" encoding="utf-8"?>
-<p:sldLayout xmlns:a="http://schemas.openxmlformats.org/drawingml/2006/main" xmlns:r="http://schemas.openxmlformats.org/officeDocument/2006/relationships" xmlns:mc="http://schemas.openxmlformats.org/markup-compatibility/2006" xmlns:mv="urn:schemas-microsoft-com:mac:vml" xmlns:p="http://schemas.openxmlformats.org/presentationml/2006/main" mc:Ignorable="mv" mc:PreserveAttributes="mv:*" type="objTx" preserve="1">
+<p:sldLayout xmlns:a="http://schemas.openxmlformats.org/drawingml/2006/main" xmlns:r="http://schemas.openxmlformats.org/officeDocument/2006/relationships" xmlns:p="http://schemas.openxmlformats.org/presentationml/2006/main" type="objTx" preserve="1">
   <p:cSld name="Content with Caption">
     <p:spTree>
       <p:nvGrpSpPr>
@@ -2897,7 +2902,7 @@
             <a:fld id="{F3BCCCC7-6A45-A647-850E-B4CE4DABA2A7}" type="datetimeFigureOut">
               <a:rPr lang="en-US" smtClean="0"/>
               <a:pPr/>
-              <a:t>9/10/12</a:t>
+              <a:t>10/18/13</a:t>
             </a:fld>
             <a:endParaRPr lang="en-US"/>
           </a:p>
@@ -2955,7 +2960,7 @@
 </file>
 
 <file path=ppt/slideLayouts/slideLayout9.xml><?xml version="1.0" encoding="utf-8"?>
-<p:sldLayout xmlns:a="http://schemas.openxmlformats.org/drawingml/2006/main" xmlns:r="http://schemas.openxmlformats.org/officeDocument/2006/relationships" xmlns:mc="http://schemas.openxmlformats.org/markup-compatibility/2006" xmlns:mv="urn:schemas-microsoft-com:mac:vml" xmlns:p="http://schemas.openxmlformats.org/presentationml/2006/main" mc:Ignorable="mv" mc:PreserveAttributes="mv:*" type="picTx" preserve="1">
+<p:sldLayout xmlns:a="http://schemas.openxmlformats.org/drawingml/2006/main" xmlns:r="http://schemas.openxmlformats.org/officeDocument/2006/relationships" xmlns:p="http://schemas.openxmlformats.org/presentationml/2006/main" type="picTx" preserve="1">
   <p:cSld name="Picture with Caption">
     <p:spTree>
       <p:nvGrpSpPr>
@@ -3147,7 +3152,7 @@
             <a:fld id="{F3BCCCC7-6A45-A647-850E-B4CE4DABA2A7}" type="datetimeFigureOut">
               <a:rPr lang="en-US" smtClean="0"/>
               <a:pPr/>
-              <a:t>9/10/12</a:t>
+              <a:t>10/18/13</a:t>
             </a:fld>
             <a:endParaRPr lang="en-US"/>
           </a:p>
@@ -3205,7 +3210,7 @@
 </file>
 
 <file path=ppt/slideMasters/slideMaster1.xml><?xml version="1.0" encoding="utf-8"?>
-<p:sldMaster xmlns:a="http://schemas.openxmlformats.org/drawingml/2006/main" xmlns:r="http://schemas.openxmlformats.org/officeDocument/2006/relationships" xmlns:mc="http://schemas.openxmlformats.org/markup-compatibility/2006" xmlns:mv="urn:schemas-microsoft-com:mac:vml" xmlns:p="http://schemas.openxmlformats.org/presentationml/2006/main" mc:Ignorable="mv" mc:PreserveAttributes="mv:*">
+<p:sldMaster xmlns:a="http://schemas.openxmlformats.org/drawingml/2006/main" xmlns:r="http://schemas.openxmlformats.org/officeDocument/2006/relationships" xmlns:p="http://schemas.openxmlformats.org/presentationml/2006/main">
   <p:cSld>
     <p:bg>
       <p:bgRef idx="1001">
@@ -3357,7 +3362,7 @@
             <a:fld id="{F3BCCCC7-6A45-A647-850E-B4CE4DABA2A7}" type="datetimeFigureOut">
               <a:rPr lang="en-US" smtClean="0"/>
               <a:pPr/>
-              <a:t>9/10/12</a:t>
+              <a:t>10/18/13</a:t>
             </a:fld>
             <a:endParaRPr lang="en-US"/>
           </a:p>
@@ -3712,7 +3717,7 @@
 </file>
 
 <file path=ppt/slides/slide1.xml><?xml version="1.0" encoding="utf-8"?>
-<p:sld xmlns:a="http://schemas.openxmlformats.org/drawingml/2006/main" xmlns:r="http://schemas.openxmlformats.org/officeDocument/2006/relationships" xmlns:mc="http://schemas.openxmlformats.org/markup-compatibility/2006" xmlns:mv="urn:schemas-microsoft-com:mac:vml" xmlns:p="http://schemas.openxmlformats.org/presentationml/2006/main" mc:Ignorable="mv" mc:PreserveAttributes="mv:*">
+<p:sld xmlns:a="http://schemas.openxmlformats.org/drawingml/2006/main" xmlns:r="http://schemas.openxmlformats.org/officeDocument/2006/relationships" xmlns:p="http://schemas.openxmlformats.org/presentationml/2006/main">
   <p:cSld>
     <p:spTree>
       <p:nvGrpSpPr>
@@ -3751,29 +3756,6 @@
           </a:p>
         </p:txBody>
       </p:sp>
-      <p:sp>
-        <p:nvSpPr>
-          <p:cNvPr id="3" name="Subtitle 2"/>
-          <p:cNvSpPr>
-            <a:spLocks noGrp="1"/>
-          </p:cNvSpPr>
-          <p:nvPr>
-            <p:ph type="subTitle" idx="1"/>
-          </p:nvPr>
-        </p:nvSpPr>
-        <p:spPr/>
-        <p:txBody>
-          <a:bodyPr/>
-          <a:lstStyle/>
-          <a:p>
-            <a:r>
-              <a:rPr lang="en-US" dirty="0" smtClean="0"/>
-              <a:t>11 September 2012, 16.30-18.00</a:t>
-            </a:r>
-            <a:endParaRPr lang="en-US" dirty="0"/>
-          </a:p>
-        </p:txBody>
-      </p:sp>
     </p:spTree>
   </p:cSld>
   <p:clrMapOvr>
@@ -3782,7 +3764,7 @@
   <p:timing>
     <p:tnLst>
       <p:par>
-        <p:cTn id="1" dur="indefinite" restart="never" nodeType="tmRoot"/>
+        <p:cTn xmlns:p14="http://schemas.microsoft.com/office/powerpoint/2010/main" id="1" dur="indefinite" restart="never" nodeType="tmRoot"/>
       </p:par>
     </p:tnLst>
   </p:timing>
@@ -3790,7 +3772,7 @@
 </file>
 
 <file path=ppt/slides/slide2.xml><?xml version="1.0" encoding="utf-8"?>
-<p:sld xmlns:a="http://schemas.openxmlformats.org/drawingml/2006/main" xmlns:r="http://schemas.openxmlformats.org/officeDocument/2006/relationships" xmlns:mc="http://schemas.openxmlformats.org/markup-compatibility/2006" xmlns:mv="urn:schemas-microsoft-com:mac:vml" xmlns:p="http://schemas.openxmlformats.org/presentationml/2006/main" mc:Ignorable="mv" mc:PreserveAttributes="mv:*">
+<p:sld xmlns:a="http://schemas.openxmlformats.org/drawingml/2006/main" xmlns:r="http://schemas.openxmlformats.org/officeDocument/2006/relationships" xmlns:p="http://schemas.openxmlformats.org/presentationml/2006/main">
   <p:cSld>
     <p:spTree>
       <p:nvGrpSpPr>
@@ -3923,7 +3905,7 @@
   <p:timing>
     <p:tnLst>
       <p:par>
-        <p:cTn id="1" dur="indefinite" restart="never" nodeType="tmRoot"/>
+        <p:cTn xmlns:p14="http://schemas.microsoft.com/office/powerpoint/2010/main" id="1" dur="indefinite" restart="never" nodeType="tmRoot"/>
       </p:par>
     </p:tnLst>
   </p:timing>
@@ -3931,7 +3913,7 @@
 </file>
 
 <file path=ppt/slides/slide3.xml><?xml version="1.0" encoding="utf-8"?>
-<p:sld xmlns:a="http://schemas.openxmlformats.org/drawingml/2006/main" xmlns:r="http://schemas.openxmlformats.org/officeDocument/2006/relationships" xmlns:mc="http://schemas.openxmlformats.org/markup-compatibility/2006" xmlns:mv="urn:schemas-microsoft-com:mac:vml" xmlns:p="http://schemas.openxmlformats.org/presentationml/2006/main" mc:Ignorable="mv" mc:PreserveAttributes="mv:*">
+<p:sld xmlns:a="http://schemas.openxmlformats.org/drawingml/2006/main" xmlns:r="http://schemas.openxmlformats.org/officeDocument/2006/relationships" xmlns:p="http://schemas.openxmlformats.org/presentationml/2006/main">
   <p:cSld>
     <p:spTree>
       <p:nvGrpSpPr>
@@ -4027,7 +4009,7 @@
   <p:timing>
     <p:tnLst>
       <p:par>
-        <p:cTn id="1" dur="indefinite" restart="never" nodeType="tmRoot"/>
+        <p:cTn xmlns:p14="http://schemas.microsoft.com/office/powerpoint/2010/main" id="1" dur="indefinite" restart="never" nodeType="tmRoot"/>
       </p:par>
     </p:tnLst>
   </p:timing>
@@ -4035,7 +4017,7 @@
 </file>
 
 <file path=ppt/slides/slide4.xml><?xml version="1.0" encoding="utf-8"?>
-<p:sld xmlns:a="http://schemas.openxmlformats.org/drawingml/2006/main" xmlns:r="http://schemas.openxmlformats.org/officeDocument/2006/relationships" xmlns:mc="http://schemas.openxmlformats.org/markup-compatibility/2006" xmlns:mv="urn:schemas-microsoft-com:mac:vml" xmlns:p="http://schemas.openxmlformats.org/presentationml/2006/main" mc:Ignorable="mv" mc:PreserveAttributes="mv:*">
+<p:sld xmlns:a="http://schemas.openxmlformats.org/drawingml/2006/main" xmlns:r="http://schemas.openxmlformats.org/officeDocument/2006/relationships" xmlns:p="http://schemas.openxmlformats.org/presentationml/2006/main">
   <p:cSld>
     <p:spTree>
       <p:nvGrpSpPr>
@@ -4178,7 +4160,7 @@
   <p:timing>
     <p:tnLst>
       <p:par>
-        <p:cTn id="1" dur="indefinite" restart="never" nodeType="tmRoot"/>
+        <p:cTn xmlns:p14="http://schemas.microsoft.com/office/powerpoint/2010/main" id="1" dur="indefinite" restart="never" nodeType="tmRoot"/>
       </p:par>
     </p:tnLst>
   </p:timing>
@@ -4186,7 +4168,7 @@
 </file>
 
 <file path=ppt/slides/slide5.xml><?xml version="1.0" encoding="utf-8"?>
-<p:sld xmlns:a="http://schemas.openxmlformats.org/drawingml/2006/main" xmlns:r="http://schemas.openxmlformats.org/officeDocument/2006/relationships" xmlns:mc="http://schemas.openxmlformats.org/markup-compatibility/2006" xmlns:mv="urn:schemas-microsoft-com:mac:vml" xmlns:p="http://schemas.openxmlformats.org/presentationml/2006/main" mc:Ignorable="mv" mc:PreserveAttributes="mv:*">
+<p:sld xmlns:a="http://schemas.openxmlformats.org/drawingml/2006/main" xmlns:r="http://schemas.openxmlformats.org/officeDocument/2006/relationships" xmlns:p="http://schemas.openxmlformats.org/presentationml/2006/main">
   <p:cSld>
     <p:spTree>
       <p:nvGrpSpPr>
@@ -4315,7 +4297,7 @@
   <p:timing>
     <p:tnLst>
       <p:par>
-        <p:cTn id="1" dur="indefinite" restart="never" nodeType="tmRoot"/>
+        <p:cTn xmlns:p14="http://schemas.microsoft.com/office/powerpoint/2010/main" id="1" dur="indefinite" restart="never" nodeType="tmRoot"/>
       </p:par>
     </p:tnLst>
   </p:timing>
@@ -4323,7 +4305,7 @@
 </file>
 
 <file path=ppt/slides/slide6.xml><?xml version="1.0" encoding="utf-8"?>
-<p:sld xmlns:a="http://schemas.openxmlformats.org/drawingml/2006/main" xmlns:r="http://schemas.openxmlformats.org/officeDocument/2006/relationships" xmlns:mc="http://schemas.openxmlformats.org/markup-compatibility/2006" xmlns:mv="urn:schemas-microsoft-com:mac:vml" xmlns:p="http://schemas.openxmlformats.org/presentationml/2006/main" mc:Ignorable="mv" mc:PreserveAttributes="mv:*">
+<p:sld xmlns:a="http://schemas.openxmlformats.org/drawingml/2006/main" xmlns:r="http://schemas.openxmlformats.org/officeDocument/2006/relationships" xmlns:p="http://schemas.openxmlformats.org/presentationml/2006/main">
   <p:cSld>
     <p:spTree>
       <p:nvGrpSpPr>
@@ -4451,7 +4433,7 @@
   <p:timing>
     <p:tnLst>
       <p:par>
-        <p:cTn id="1" dur="indefinite" restart="never" nodeType="tmRoot"/>
+        <p:cTn xmlns:p14="http://schemas.microsoft.com/office/powerpoint/2010/main" id="1" dur="indefinite" restart="never" nodeType="tmRoot"/>
       </p:par>
     </p:tnLst>
   </p:timing>
@@ -4459,7 +4441,7 @@
 </file>
 
 <file path=ppt/slides/slide7.xml><?xml version="1.0" encoding="utf-8"?>
-<p:sld xmlns:a="http://schemas.openxmlformats.org/drawingml/2006/main" xmlns:r="http://schemas.openxmlformats.org/officeDocument/2006/relationships" xmlns:mc="http://schemas.openxmlformats.org/markup-compatibility/2006" xmlns:mv="urn:schemas-microsoft-com:mac:vml" xmlns:p="http://schemas.openxmlformats.org/presentationml/2006/main" mc:Ignorable="mv" mc:PreserveAttributes="mv:*">
+<p:sld xmlns:a="http://schemas.openxmlformats.org/drawingml/2006/main" xmlns:r="http://schemas.openxmlformats.org/officeDocument/2006/relationships" xmlns:p="http://schemas.openxmlformats.org/presentationml/2006/main">
   <p:cSld>
     <p:spTree>
       <p:nvGrpSpPr>
@@ -4508,26 +4490,13 @@
             <p:ph idx="1"/>
           </p:nvPr>
         </p:nvPicPr>
-        <mc:AlternateContent>
-          <mc:Choice xmlns:ma="http://schemas.microsoft.com/office/mac/drawingml/2008/main" Requires="ma">
-            <p:blipFill>
-              <a:blip r:embed="rId3"/>
-              <a:srcRect l="2525" t="23206"/>
-              <a:stretch>
-                <a:fillRect/>
-              </a:stretch>
-            </p:blipFill>
-          </mc:Choice>
-          <mc:Fallback>
-            <p:blipFill>
-              <a:blip r:embed="rId4"/>
-              <a:srcRect l="2525" t="23206"/>
-              <a:stretch>
-                <a:fillRect/>
-              </a:stretch>
-            </p:blipFill>
-          </mc:Fallback>
-        </mc:AlternateContent>
+        <p:blipFill>
+          <a:blip r:embed="rId3"/>
+          <a:srcRect l="2525" t="23206"/>
+          <a:stretch>
+            <a:fillRect/>
+          </a:stretch>
+        </p:blipFill>
         <p:spPr>
           <a:xfrm>
             <a:off x="76200" y="1371600"/>
@@ -4543,7 +4512,7 @@
   <p:timing>
     <p:tnLst>
       <p:par>
-        <p:cTn id="1" dur="indefinite" restart="never" nodeType="tmRoot"/>
+        <p:cTn xmlns:p14="http://schemas.microsoft.com/office/powerpoint/2010/main" id="1" dur="indefinite" restart="never" nodeType="tmRoot"/>
       </p:par>
     </p:tnLst>
   </p:timing>
@@ -4551,7 +4520,7 @@
 </file>
 
 <file path=ppt/slides/slide8.xml><?xml version="1.0" encoding="utf-8"?>
-<p:sld xmlns:a="http://schemas.openxmlformats.org/drawingml/2006/main" xmlns:r="http://schemas.openxmlformats.org/officeDocument/2006/relationships" xmlns:mc="http://schemas.openxmlformats.org/markup-compatibility/2006" xmlns:mv="urn:schemas-microsoft-com:mac:vml" xmlns:p="http://schemas.openxmlformats.org/presentationml/2006/main" mc:Ignorable="mv" mc:PreserveAttributes="mv:*">
+<p:sld xmlns:a="http://schemas.openxmlformats.org/drawingml/2006/main" xmlns:r="http://schemas.openxmlformats.org/officeDocument/2006/relationships" xmlns:p="http://schemas.openxmlformats.org/presentationml/2006/main">
   <p:cSld>
     <p:spTree>
       <p:nvGrpSpPr>
@@ -4603,7 +4572,7 @@
         <p:spPr/>
         <p:txBody>
           <a:bodyPr>
-            <a:normAutofit lnSpcReduction="10000"/>
+            <a:normAutofit fontScale="92500" lnSpcReduction="20000"/>
           </a:bodyPr>
           <a:lstStyle/>
           <a:p>
@@ -4648,15 +4617,57 @@
             <a:pPr lvl="1"/>
             <a:r>
               <a:rPr lang="en-US" sz="2000" dirty="0" smtClean="0"/>
-              <a:t>run 'make'</a:t>
-            </a:r>
+              <a:t>run '</a:t>
+            </a:r>
+            <a:r>
+              <a:rPr lang="en-US" sz="2000" dirty="0" smtClean="0"/>
+              <a:t>make’</a:t>
+            </a:r>
+            <a:endParaRPr lang="en-US" sz="2000" dirty="0" smtClean="0"/>
           </a:p>
           <a:p>
             <a:pPr lvl="1"/>
             <a:r>
+              <a:rPr lang="en-US" sz="2000" dirty="0"/>
+              <a:t>r</a:t>
+            </a:r>
+            <a:r>
               <a:rPr lang="en-US" sz="2000" dirty="0" smtClean="0"/>
-              <a:t>add the root directory to your PATH environment variable</a:t>
-            </a:r>
+              <a:t>un ./</a:t>
+            </a:r>
+            <a:r>
+              <a:rPr lang="en-US" sz="2000" dirty="0" err="1" smtClean="0"/>
+              <a:t>bwa</a:t>
+            </a:r>
+            <a:r>
+              <a:rPr lang="en-US" sz="2000" dirty="0"/>
+              <a:t> </a:t>
+            </a:r>
+            <a:r>
+              <a:rPr lang="en-US" sz="2000" dirty="0" smtClean="0"/>
+              <a:t>to see that it prints its version and usage,</a:t>
+            </a:r>
+            <a:r>
+              <a:rPr lang="en-US" sz="2000" dirty="0"/>
+              <a:t> c</a:t>
+            </a:r>
+            <a:r>
+              <a:rPr lang="en-US" sz="2000" dirty="0" smtClean="0"/>
+              <a:t>ompare to the </a:t>
+            </a:r>
+            <a:r>
+              <a:rPr lang="en-US" sz="2000" dirty="0" err="1" smtClean="0"/>
+              <a:t>bwa</a:t>
+            </a:r>
+            <a:r>
+              <a:rPr lang="en-US" sz="2000" dirty="0"/>
+              <a:t> </a:t>
+            </a:r>
+            <a:r>
+              <a:rPr lang="en-US" sz="2000" dirty="0" smtClean="0"/>
+              <a:t>in PATH</a:t>
+            </a:r>
+            <a:endParaRPr lang="en-US" sz="2000" dirty="0" smtClean="0"/>
           </a:p>
           <a:p>
             <a:r>
@@ -4708,23 +4719,37 @@
             <a:pPr lvl="1"/>
             <a:r>
               <a:rPr lang="en-US" sz="2000" dirty="0" smtClean="0"/>
-              <a:t>run 'make'</a:t>
-            </a:r>
+              <a:t>run '</a:t>
+            </a:r>
+            <a:r>
+              <a:rPr lang="en-US" sz="2000" dirty="0" smtClean="0"/>
+              <a:t>make’</a:t>
+            </a:r>
+            <a:endParaRPr lang="en-US" sz="2000" dirty="0" smtClean="0"/>
           </a:p>
           <a:p>
             <a:pPr lvl="1"/>
             <a:r>
               <a:rPr lang="en-US" sz="2000" dirty="0" smtClean="0"/>
-              <a:t>add the root directory, </a:t>
+              <a:t>Run ./</a:t>
             </a:r>
             <a:r>
               <a:rPr lang="en-US" sz="2000" dirty="0" err="1" smtClean="0"/>
-              <a:t>bcftools</a:t>
+              <a:t>samtools</a:t>
             </a:r>
             <a:r>
               <a:rPr lang="en-US" sz="2000" dirty="0" smtClean="0"/>
-              <a:t> and misc to the PATH</a:t>
-            </a:r>
+              <a:t> to see that it prints its version and usage, compare to </a:t>
+            </a:r>
+            <a:r>
+              <a:rPr lang="en-US" sz="2000" dirty="0" err="1" smtClean="0"/>
+              <a:t>samtools</a:t>
+            </a:r>
+            <a:r>
+              <a:rPr lang="en-US" sz="2000" dirty="0" smtClean="0"/>
+              <a:t> in PATH</a:t>
+            </a:r>
+            <a:endParaRPr lang="en-US" sz="2000" dirty="0" smtClean="0"/>
           </a:p>
         </p:txBody>
       </p:sp>
@@ -4736,7 +4761,7 @@
   <p:timing>
     <p:tnLst>
       <p:par>
-        <p:cTn id="1" dur="indefinite" restart="never" nodeType="tmRoot"/>
+        <p:cTn xmlns:p14="http://schemas.microsoft.com/office/powerpoint/2010/main" id="1" dur="indefinite" restart="never" nodeType="tmRoot"/>
       </p:par>
     </p:tnLst>
   </p:timing>

</xml_diff>